<commit_message>
Added readme and final exports
</commit_message>
<xml_diff>
--- a/docs/Swiggy - DS Assessment - Sudhanva Narayana.pptx
+++ b/docs/Swiggy - DS Assessment - Sudhanva Narayana.pptx
@@ -3424,6 +3424,50 @@
           </a:p>
         </p:txBody>
       </p:sp>
+      <p:sp>
+        <p:nvSpPr>
+          <p:cNvPr id="5" name="TextBox 4">
+            <a:extLst>
+              <a:ext uri="{FF2B5EF4-FFF2-40B4-BE49-F238E27FC236}">
+                <a16:creationId xmlns:a16="http://schemas.microsoft.com/office/drawing/2014/main" id="{B9773730-2100-406E-ABBA-4604A5B2F4E7}"/>
+              </a:ext>
+            </a:extLst>
+          </p:cNvPr>
+          <p:cNvSpPr txBox="1"/>
+          <p:nvPr/>
+        </p:nvSpPr>
+        <p:spPr>
+          <a:xfrm>
+            <a:off x="653483" y="5258583"/>
+            <a:ext cx="5789918" cy="954107"/>
+          </a:xfrm>
+          <a:prstGeom prst="rect">
+            <a:avLst/>
+          </a:prstGeom>
+          <a:noFill/>
+        </p:spPr>
+        <p:txBody>
+          <a:bodyPr wrap="none" rtlCol="0">
+            <a:spAutoFit/>
+          </a:bodyPr>
+          <a:lstStyle/>
+          <a:p>
+            <a:r>
+              <a:rPr lang="en-US" sz="2800" dirty="0"/>
+              <a:t>Source Code:</a:t>
+            </a:r>
+          </a:p>
+          <a:p>
+            <a:r>
+              <a:rPr lang="en-US" sz="2800" dirty="0">
+                <a:hlinkClick r:id="rId2"/>
+              </a:rPr>
+              <a:t>https://github.com/nsudhanva/swiggy</a:t>
+            </a:r>
+            <a:endParaRPr lang="en-US" sz="2800" dirty="0"/>
+          </a:p>
+        </p:txBody>
+      </p:sp>
     </p:spTree>
     <p:extLst>
       <p:ext uri="{BB962C8B-B14F-4D97-AF65-F5344CB8AC3E}">

</xml_diff>